<commit_message>
Finished the presentations! :O Now just maybe need some small finish.
</commit_message>
<xml_diff>
--- a/KU/IT-sikkerhed.pptx
+++ b/KU/IT-sikkerhed.pptx
@@ -13,28 +13,31 @@
     <p:sldId id="267" r:id="rId7"/>
     <p:sldId id="260" r:id="rId8"/>
     <p:sldId id="276" r:id="rId9"/>
-    <p:sldId id="277" r:id="rId10"/>
-    <p:sldId id="263" r:id="rId11"/>
-    <p:sldId id="264" r:id="rId12"/>
-    <p:sldId id="265" r:id="rId13"/>
-    <p:sldId id="266" r:id="rId14"/>
-    <p:sldId id="268" r:id="rId15"/>
-    <p:sldId id="269" r:id="rId16"/>
-    <p:sldId id="270" r:id="rId17"/>
-    <p:sldId id="271" r:id="rId18"/>
-    <p:sldId id="273" r:id="rId19"/>
-    <p:sldId id="272" r:id="rId20"/>
-    <p:sldId id="274" r:id="rId21"/>
-    <p:sldId id="278" r:id="rId22"/>
-    <p:sldId id="275" r:id="rId23"/>
-    <p:sldId id="279" r:id="rId24"/>
-    <p:sldId id="280" r:id="rId25"/>
-    <p:sldId id="281" r:id="rId26"/>
-    <p:sldId id="282" r:id="rId27"/>
-    <p:sldId id="283" r:id="rId28"/>
-    <p:sldId id="284" r:id="rId29"/>
-    <p:sldId id="285" r:id="rId30"/>
-    <p:sldId id="286" r:id="rId31"/>
+    <p:sldId id="287" r:id="rId10"/>
+    <p:sldId id="277" r:id="rId11"/>
+    <p:sldId id="263" r:id="rId12"/>
+    <p:sldId id="264" r:id="rId13"/>
+    <p:sldId id="265" r:id="rId14"/>
+    <p:sldId id="266" r:id="rId15"/>
+    <p:sldId id="268" r:id="rId16"/>
+    <p:sldId id="269" r:id="rId17"/>
+    <p:sldId id="270" r:id="rId18"/>
+    <p:sldId id="271" r:id="rId19"/>
+    <p:sldId id="273" r:id="rId20"/>
+    <p:sldId id="272" r:id="rId21"/>
+    <p:sldId id="274" r:id="rId22"/>
+    <p:sldId id="289" r:id="rId23"/>
+    <p:sldId id="278" r:id="rId24"/>
+    <p:sldId id="275" r:id="rId25"/>
+    <p:sldId id="279" r:id="rId26"/>
+    <p:sldId id="280" r:id="rId27"/>
+    <p:sldId id="281" r:id="rId28"/>
+    <p:sldId id="282" r:id="rId29"/>
+    <p:sldId id="288" r:id="rId30"/>
+    <p:sldId id="283" r:id="rId31"/>
+    <p:sldId id="284" r:id="rId32"/>
+    <p:sldId id="285" r:id="rId33"/>
+    <p:sldId id="286" r:id="rId34"/>
   </p:sldIdLst>
   <p:sldSz cx="12192000" cy="6858000"/>
   <p:notesSz cx="6858000" cy="9144000"/>
@@ -270,7 +273,7 @@
           <a:p>
             <a:fld id="{BA224F2B-A767-425E-8374-E42CDBF76FF9}" type="datetimeFigureOut">
               <a:rPr lang="da-DK" smtClean="0"/>
-              <a:t>06-11-2016</a:t>
+              <a:t>07-11-2016</a:t>
             </a:fld>
             <a:endParaRPr lang="da-DK"/>
           </a:p>
@@ -438,7 +441,7 @@
           <a:p>
             <a:fld id="{BA224F2B-A767-425E-8374-E42CDBF76FF9}" type="datetimeFigureOut">
               <a:rPr lang="da-DK" smtClean="0"/>
-              <a:t>06-11-2016</a:t>
+              <a:t>07-11-2016</a:t>
             </a:fld>
             <a:endParaRPr lang="da-DK"/>
           </a:p>
@@ -616,7 +619,7 @@
           <a:p>
             <a:fld id="{BA224F2B-A767-425E-8374-E42CDBF76FF9}" type="datetimeFigureOut">
               <a:rPr lang="da-DK" smtClean="0"/>
-              <a:t>06-11-2016</a:t>
+              <a:t>07-11-2016</a:t>
             </a:fld>
             <a:endParaRPr lang="da-DK"/>
           </a:p>
@@ -784,7 +787,7 @@
           <a:p>
             <a:fld id="{BA224F2B-A767-425E-8374-E42CDBF76FF9}" type="datetimeFigureOut">
               <a:rPr lang="da-DK" smtClean="0"/>
-              <a:t>06-11-2016</a:t>
+              <a:t>07-11-2016</a:t>
             </a:fld>
             <a:endParaRPr lang="da-DK"/>
           </a:p>
@@ -1029,7 +1032,7 @@
           <a:p>
             <a:fld id="{BA224F2B-A767-425E-8374-E42CDBF76FF9}" type="datetimeFigureOut">
               <a:rPr lang="da-DK" smtClean="0"/>
-              <a:t>06-11-2016</a:t>
+              <a:t>07-11-2016</a:t>
             </a:fld>
             <a:endParaRPr lang="da-DK"/>
           </a:p>
@@ -1258,7 +1261,7 @@
           <a:p>
             <a:fld id="{BA224F2B-A767-425E-8374-E42CDBF76FF9}" type="datetimeFigureOut">
               <a:rPr lang="da-DK" smtClean="0"/>
-              <a:t>06-11-2016</a:t>
+              <a:t>07-11-2016</a:t>
             </a:fld>
             <a:endParaRPr lang="da-DK"/>
           </a:p>
@@ -1622,7 +1625,7 @@
           <a:p>
             <a:fld id="{BA224F2B-A767-425E-8374-E42CDBF76FF9}" type="datetimeFigureOut">
               <a:rPr lang="da-DK" smtClean="0"/>
-              <a:t>06-11-2016</a:t>
+              <a:t>07-11-2016</a:t>
             </a:fld>
             <a:endParaRPr lang="da-DK"/>
           </a:p>
@@ -1739,7 +1742,7 @@
           <a:p>
             <a:fld id="{BA224F2B-A767-425E-8374-E42CDBF76FF9}" type="datetimeFigureOut">
               <a:rPr lang="da-DK" smtClean="0"/>
-              <a:t>06-11-2016</a:t>
+              <a:t>07-11-2016</a:t>
             </a:fld>
             <a:endParaRPr lang="da-DK"/>
           </a:p>
@@ -1834,7 +1837,7 @@
           <a:p>
             <a:fld id="{BA224F2B-A767-425E-8374-E42CDBF76FF9}" type="datetimeFigureOut">
               <a:rPr lang="da-DK" smtClean="0"/>
-              <a:t>06-11-2016</a:t>
+              <a:t>07-11-2016</a:t>
             </a:fld>
             <a:endParaRPr lang="da-DK"/>
           </a:p>
@@ -2109,7 +2112,7 @@
           <a:p>
             <a:fld id="{BA224F2B-A767-425E-8374-E42CDBF76FF9}" type="datetimeFigureOut">
               <a:rPr lang="da-DK" smtClean="0"/>
-              <a:t>06-11-2016</a:t>
+              <a:t>07-11-2016</a:t>
             </a:fld>
             <a:endParaRPr lang="da-DK"/>
           </a:p>
@@ -2361,7 +2364,7 @@
           <a:p>
             <a:fld id="{BA224F2B-A767-425E-8374-E42CDBF76FF9}" type="datetimeFigureOut">
               <a:rPr lang="da-DK" smtClean="0"/>
-              <a:t>06-11-2016</a:t>
+              <a:t>07-11-2016</a:t>
             </a:fld>
             <a:endParaRPr lang="da-DK"/>
           </a:p>
@@ -2572,7 +2575,7 @@
           <a:p>
             <a:fld id="{BA224F2B-A767-425E-8374-E42CDBF76FF9}" type="datetimeFigureOut">
               <a:rPr lang="da-DK" smtClean="0"/>
-              <a:t>06-11-2016</a:t>
+              <a:t>07-11-2016</a:t>
             </a:fld>
             <a:endParaRPr lang="da-DK"/>
           </a:p>
@@ -3073,16 +3076,8 @@
           <a:lstStyle/>
           <a:p>
             <a:r>
-              <a:rPr lang="da-DK" b="1" dirty="0"/>
-              <a:t>Key </a:t>
-            </a:r>
-            <a:r>
-              <a:rPr lang="da-DK" b="1" dirty="0" err="1"/>
-              <a:t>take-away</a:t>
-            </a:r>
-            <a:r>
-              <a:rPr lang="da-DK" b="1" dirty="0"/>
-              <a:t> 1</a:t>
+              <a:rPr lang="da-DK" dirty="0"/>
+              <a:t>Organisatoriske/menneskelige angrebspunkter</a:t>
             </a:r>
           </a:p>
         </p:txBody>
@@ -3099,17 +3094,62 @@
         </p:nvSpPr>
         <p:spPr/>
         <p:txBody>
-          <a:bodyPr>
-            <a:normAutofit/>
-          </a:bodyPr>
-          <a:lstStyle/>
-          <a:p>
-            <a:pPr marL="0" indent="0">
-              <a:buNone/>
-            </a:pPr>
-            <a:r>
-              <a:rPr lang="da-DK" sz="8800" dirty="0"/>
-              <a:t>Dit system er (formentlig) usikkert!</a:t>
+          <a:bodyPr/>
+          <a:lstStyle/>
+          <a:p>
+            <a:r>
+              <a:rPr lang="da-DK" dirty="0"/>
+              <a:t>Der er mange </a:t>
+            </a:r>
+            <a:r>
+              <a:rPr lang="da-DK" dirty="0">
+                <a:sym typeface="Wingdings" panose="05000000000000000000" pitchFamily="2" charset="2"/>
+              </a:rPr>
+              <a:t></a:t>
+            </a:r>
+          </a:p>
+          <a:p>
+            <a:r>
+              <a:rPr lang="da-DK" dirty="0">
+                <a:sym typeface="Wingdings" panose="05000000000000000000" pitchFamily="2" charset="2"/>
+              </a:rPr>
+              <a:t>De organisatoriske angreb er generelt en form for social </a:t>
+            </a:r>
+            <a:r>
+              <a:rPr lang="da-DK" dirty="0" err="1">
+                <a:sym typeface="Wingdings" panose="05000000000000000000" pitchFamily="2" charset="2"/>
+              </a:rPr>
+              <a:t>engineering</a:t>
+            </a:r>
+            <a:endParaRPr lang="da-DK" dirty="0">
+              <a:sym typeface="Wingdings" panose="05000000000000000000" pitchFamily="2" charset="2"/>
+            </a:endParaRPr>
+          </a:p>
+          <a:p>
+            <a:r>
+              <a:rPr lang="da-DK" dirty="0" err="1"/>
+              <a:t>Tailgating</a:t>
+            </a:r>
+            <a:endParaRPr lang="da-DK" dirty="0"/>
+          </a:p>
+          <a:p>
+            <a:r>
+              <a:rPr lang="da-DK" dirty="0"/>
+              <a:t>Forstillelse (</a:t>
+            </a:r>
+            <a:r>
+              <a:rPr lang="da-DK" dirty="0" err="1"/>
+              <a:t>impersonation</a:t>
+            </a:r>
+            <a:r>
+              <a:rPr lang="da-DK" dirty="0"/>
+              <a:t>)</a:t>
+            </a:r>
+          </a:p>
+          <a:p>
+            <a:r>
+              <a:rPr lang="da-DK" dirty="0"/>
+              <a:t>Identitetstyveri</a:t>
             </a:r>
           </a:p>
         </p:txBody>
@@ -3117,7 +3157,7 @@
     </p:spTree>
     <p:extLst>
       <p:ext uri="{BB962C8B-B14F-4D97-AF65-F5344CB8AC3E}">
-        <p14:creationId xmlns:p14="http://schemas.microsoft.com/office/powerpoint/2010/main" val="1665345544"/>
+        <p14:creationId xmlns:p14="http://schemas.microsoft.com/office/powerpoint/2010/main" val="3223428623"/>
       </p:ext>
     </p:extLst>
   </p:cSld>
@@ -3160,6 +3200,93 @@
           <a:lstStyle/>
           <a:p>
             <a:r>
+              <a:rPr lang="da-DK" b="1" dirty="0"/>
+              <a:t>Key </a:t>
+            </a:r>
+            <a:r>
+              <a:rPr lang="da-DK" b="1" dirty="0" err="1"/>
+              <a:t>take-away</a:t>
+            </a:r>
+            <a:r>
+              <a:rPr lang="da-DK" b="1" dirty="0"/>
+              <a:t> 1</a:t>
+            </a:r>
+          </a:p>
+        </p:txBody>
+      </p:sp>
+      <p:sp>
+        <p:nvSpPr>
+          <p:cNvPr id="3" name="Pladsholder til indhold 2"/>
+          <p:cNvSpPr>
+            <a:spLocks noGrp="1"/>
+          </p:cNvSpPr>
+          <p:nvPr>
+            <p:ph idx="1"/>
+          </p:nvPr>
+        </p:nvSpPr>
+        <p:spPr/>
+        <p:txBody>
+          <a:bodyPr>
+            <a:normAutofit/>
+          </a:bodyPr>
+          <a:lstStyle/>
+          <a:p>
+            <a:pPr marL="0" indent="0">
+              <a:buNone/>
+            </a:pPr>
+            <a:r>
+              <a:rPr lang="da-DK" sz="8800" dirty="0"/>
+              <a:t>Dit system er (formentlig) usikkert!</a:t>
+            </a:r>
+          </a:p>
+        </p:txBody>
+      </p:sp>
+    </p:spTree>
+    <p:extLst>
+      <p:ext uri="{BB962C8B-B14F-4D97-AF65-F5344CB8AC3E}">
+        <p14:creationId xmlns:p14="http://schemas.microsoft.com/office/powerpoint/2010/main" val="1665345544"/>
+      </p:ext>
+    </p:extLst>
+  </p:cSld>
+  <p:clrMapOvr>
+    <a:masterClrMapping/>
+  </p:clrMapOvr>
+</p:sld>
+</file>
+
+<file path=ppt/slides/slide12.xml><?xml version="1.0" encoding="utf-8"?>
+<p:sld xmlns:a="http://schemas.openxmlformats.org/drawingml/2006/main" xmlns:r="http://schemas.openxmlformats.org/officeDocument/2006/relationships" xmlns:p="http://schemas.openxmlformats.org/presentationml/2006/main">
+  <p:cSld>
+    <p:spTree>
+      <p:nvGrpSpPr>
+        <p:cNvPr id="1" name=""/>
+        <p:cNvGrpSpPr/>
+        <p:nvPr/>
+      </p:nvGrpSpPr>
+      <p:grpSpPr>
+        <a:xfrm>
+          <a:off x="0" y="0"/>
+          <a:ext cx="0" cy="0"/>
+          <a:chOff x="0" y="0"/>
+          <a:chExt cx="0" cy="0"/>
+        </a:xfrm>
+      </p:grpSpPr>
+      <p:sp>
+        <p:nvSpPr>
+          <p:cNvPr id="2" name="Titel 1"/>
+          <p:cNvSpPr>
+            <a:spLocks noGrp="1"/>
+          </p:cNvSpPr>
+          <p:nvPr>
+            <p:ph type="title"/>
+          </p:nvPr>
+        </p:nvSpPr>
+        <p:spPr/>
+        <p:txBody>
+          <a:bodyPr/>
+          <a:lstStyle/>
+          <a:p>
+            <a:r>
               <a:rPr lang="da-DK" dirty="0"/>
               <a:t>Overblik over kryptografi</a:t>
             </a:r>
@@ -3259,7 +3386,7 @@
 </p:sld>
 </file>
 
-<file path=ppt/slides/slide12.xml><?xml version="1.0" encoding="utf-8"?>
+<file path=ppt/slides/slide13.xml><?xml version="1.0" encoding="utf-8"?>
 <p:sld xmlns:a="http://schemas.openxmlformats.org/drawingml/2006/main" xmlns:r="http://schemas.openxmlformats.org/officeDocument/2006/relationships" xmlns:p="http://schemas.openxmlformats.org/presentationml/2006/main">
   <p:cSld>
     <p:spTree>
@@ -3627,7 +3754,7 @@
 </p:sld>
 </file>
 
-<file path=ppt/slides/slide13.xml><?xml version="1.0" encoding="utf-8"?>
+<file path=ppt/slides/slide14.xml><?xml version="1.0" encoding="utf-8"?>
 <p:sld xmlns:a="http://schemas.openxmlformats.org/drawingml/2006/main" xmlns:r="http://schemas.openxmlformats.org/officeDocument/2006/relationships" xmlns:p="http://schemas.openxmlformats.org/presentationml/2006/main">
   <p:cSld>
     <p:spTree>
@@ -3782,7 +3909,7 @@
 </p:sld>
 </file>
 
-<file path=ppt/slides/slide14.xml><?xml version="1.0" encoding="utf-8"?>
+<file path=ppt/slides/slide15.xml><?xml version="1.0" encoding="utf-8"?>
 <p:sld xmlns:a="http://schemas.openxmlformats.org/drawingml/2006/main" xmlns:r="http://schemas.openxmlformats.org/officeDocument/2006/relationships" xmlns:p="http://schemas.openxmlformats.org/presentationml/2006/main">
   <p:cSld>
     <p:spTree>
@@ -3844,13 +3971,7 @@
           <a:p>
             <a:r>
               <a:rPr lang="da-DK" dirty="0"/>
-              <a:t>Vælg fx en matrix på 5 rækker og 7 kolonner og rækkefølgen 6 3 1 5 2 7 4 eller noget andet valgfrit. </a:t>
-            </a:r>
-          </a:p>
-          <a:p>
-            <a:r>
-              <a:rPr lang="da-DK" dirty="0"/>
-              <a:t>10 min. </a:t>
+              <a:t>Vælg fx en matrix på 5 rækker og 7 kolonner og rækkefølgen 6 3 1 5 2 7 4 eller noget andet valgfrit.</a:t>
             </a:r>
           </a:p>
         </p:txBody>
@@ -3868,7 +3989,7 @@
 </p:sld>
 </file>
 
-<file path=ppt/slides/slide15.xml><?xml version="1.0" encoding="utf-8"?>
+<file path=ppt/slides/slide16.xml><?xml version="1.0" encoding="utf-8"?>
 <p:sld xmlns:a="http://schemas.openxmlformats.org/drawingml/2006/main" xmlns:r="http://schemas.openxmlformats.org/officeDocument/2006/relationships" xmlns:p="http://schemas.openxmlformats.org/presentationml/2006/main">
   <p:cSld>
     <p:spTree>
@@ -4116,7 +4237,7 @@
 </p:sld>
 </file>
 
-<file path=ppt/slides/slide16.xml><?xml version="1.0" encoding="utf-8"?>
+<file path=ppt/slides/slide17.xml><?xml version="1.0" encoding="utf-8"?>
 <p:sld xmlns:a="http://schemas.openxmlformats.org/drawingml/2006/main" xmlns:r="http://schemas.openxmlformats.org/officeDocument/2006/relationships" xmlns:p="http://schemas.openxmlformats.org/presentationml/2006/main">
   <p:cSld>
     <p:spTree>
@@ -4565,7 +4686,7 @@
 </p:sld>
 </file>
 
-<file path=ppt/slides/slide17.xml><?xml version="1.0" encoding="utf-8"?>
+<file path=ppt/slides/slide18.xml><?xml version="1.0" encoding="utf-8"?>
 <p:sld xmlns:a="http://schemas.openxmlformats.org/drawingml/2006/main" xmlns:r="http://schemas.openxmlformats.org/officeDocument/2006/relationships" xmlns:p="http://schemas.openxmlformats.org/presentationml/2006/main">
   <p:cSld>
     <p:spTree>
@@ -4651,7 +4772,7 @@
 </p:sld>
 </file>
 
-<file path=ppt/slides/slide18.xml><?xml version="1.0" encoding="utf-8"?>
+<file path=ppt/slides/slide19.xml><?xml version="1.0" encoding="utf-8"?>
 <p:sld xmlns:a="http://schemas.openxmlformats.org/drawingml/2006/main" xmlns:r="http://schemas.openxmlformats.org/officeDocument/2006/relationships" xmlns:p="http://schemas.openxmlformats.org/presentationml/2006/main">
   <p:cSld>
     <p:spTree>
@@ -4790,100 +4911,6 @@
 </p:sld>
 </file>
 
-<file path=ppt/slides/slide19.xml><?xml version="1.0" encoding="utf-8"?>
-<p:sld xmlns:a="http://schemas.openxmlformats.org/drawingml/2006/main" xmlns:r="http://schemas.openxmlformats.org/officeDocument/2006/relationships" xmlns:p="http://schemas.openxmlformats.org/presentationml/2006/main">
-  <p:cSld>
-    <p:spTree>
-      <p:nvGrpSpPr>
-        <p:cNvPr id="1" name=""/>
-        <p:cNvGrpSpPr/>
-        <p:nvPr/>
-      </p:nvGrpSpPr>
-      <p:grpSpPr>
-        <a:xfrm>
-          <a:off x="0" y="0"/>
-          <a:ext cx="0" cy="0"/>
-          <a:chOff x="0" y="0"/>
-          <a:chExt cx="0" cy="0"/>
-        </a:xfrm>
-      </p:grpSpPr>
-      <p:sp>
-        <p:nvSpPr>
-          <p:cNvPr id="2" name="Titel 1"/>
-          <p:cNvSpPr>
-            <a:spLocks noGrp="1"/>
-          </p:cNvSpPr>
-          <p:nvPr>
-            <p:ph type="title"/>
-          </p:nvPr>
-        </p:nvSpPr>
-        <p:spPr/>
-        <p:txBody>
-          <a:bodyPr/>
-          <a:lstStyle/>
-          <a:p>
-            <a:r>
-              <a:rPr lang="da-DK" dirty="0"/>
-              <a:t>Typer af moderne kryptografi</a:t>
-            </a:r>
-          </a:p>
-        </p:txBody>
-      </p:sp>
-      <p:sp>
-        <p:nvSpPr>
-          <p:cNvPr id="3" name="Pladsholder til indhold 2"/>
-          <p:cNvSpPr>
-            <a:spLocks noGrp="1"/>
-          </p:cNvSpPr>
-          <p:nvPr>
-            <p:ph idx="1"/>
-          </p:nvPr>
-        </p:nvSpPr>
-        <p:spPr/>
-        <p:txBody>
-          <a:bodyPr/>
-          <a:lstStyle/>
-          <a:p>
-            <a:r>
-              <a:rPr lang="da-DK" dirty="0"/>
-              <a:t>Symmetrisk kryptering </a:t>
-            </a:r>
-          </a:p>
-          <a:p>
-            <a:r>
-              <a:rPr lang="da-DK" dirty="0"/>
-              <a:t>Asymmetrisk kryptering</a:t>
-            </a:r>
-          </a:p>
-          <a:p>
-            <a:r>
-              <a:rPr lang="da-DK" dirty="0"/>
-              <a:t>Envejsfunktioner og </a:t>
-            </a:r>
-            <a:r>
-              <a:rPr lang="da-DK" dirty="0" err="1"/>
-              <a:t>hashing</a:t>
-            </a:r>
-            <a:endParaRPr lang="da-DK" dirty="0"/>
-          </a:p>
-          <a:p>
-            <a:endParaRPr lang="da-DK" dirty="0"/>
-          </a:p>
-        </p:txBody>
-      </p:sp>
-    </p:spTree>
-    <p:extLst>
-      <p:ext uri="{BB962C8B-B14F-4D97-AF65-F5344CB8AC3E}">
-        <p14:creationId xmlns:p14="http://schemas.microsoft.com/office/powerpoint/2010/main" val="601381868"/>
-      </p:ext>
-    </p:extLst>
-  </p:cSld>
-  <p:clrMapOvr>
-    <a:masterClrMapping/>
-  </p:clrMapOvr>
-</p:sld>
-</file>
-
 <file path=ppt/slides/slide2.xml><?xml version="1.0" encoding="utf-8"?>
 <p:sld xmlns:a="http://schemas.openxmlformats.org/drawingml/2006/main" xmlns:r="http://schemas.openxmlformats.org/officeDocument/2006/relationships" xmlns:p="http://schemas.openxmlformats.org/presentationml/2006/main">
   <p:cSld>
@@ -5040,6 +5067,100 @@
 </file>
 
 <file path=ppt/slides/slide20.xml><?xml version="1.0" encoding="utf-8"?>
+<p:sld xmlns:a="http://schemas.openxmlformats.org/drawingml/2006/main" xmlns:r="http://schemas.openxmlformats.org/officeDocument/2006/relationships" xmlns:p="http://schemas.openxmlformats.org/presentationml/2006/main">
+  <p:cSld>
+    <p:spTree>
+      <p:nvGrpSpPr>
+        <p:cNvPr id="1" name=""/>
+        <p:cNvGrpSpPr/>
+        <p:nvPr/>
+      </p:nvGrpSpPr>
+      <p:grpSpPr>
+        <a:xfrm>
+          <a:off x="0" y="0"/>
+          <a:ext cx="0" cy="0"/>
+          <a:chOff x="0" y="0"/>
+          <a:chExt cx="0" cy="0"/>
+        </a:xfrm>
+      </p:grpSpPr>
+      <p:sp>
+        <p:nvSpPr>
+          <p:cNvPr id="2" name="Titel 1"/>
+          <p:cNvSpPr>
+            <a:spLocks noGrp="1"/>
+          </p:cNvSpPr>
+          <p:nvPr>
+            <p:ph type="title"/>
+          </p:nvPr>
+        </p:nvSpPr>
+        <p:spPr/>
+        <p:txBody>
+          <a:bodyPr/>
+          <a:lstStyle/>
+          <a:p>
+            <a:r>
+              <a:rPr lang="da-DK" dirty="0"/>
+              <a:t>Typer af moderne kryptografi</a:t>
+            </a:r>
+          </a:p>
+        </p:txBody>
+      </p:sp>
+      <p:sp>
+        <p:nvSpPr>
+          <p:cNvPr id="3" name="Pladsholder til indhold 2"/>
+          <p:cNvSpPr>
+            <a:spLocks noGrp="1"/>
+          </p:cNvSpPr>
+          <p:nvPr>
+            <p:ph idx="1"/>
+          </p:nvPr>
+        </p:nvSpPr>
+        <p:spPr/>
+        <p:txBody>
+          <a:bodyPr/>
+          <a:lstStyle/>
+          <a:p>
+            <a:r>
+              <a:rPr lang="da-DK" dirty="0"/>
+              <a:t>Symmetrisk kryptering </a:t>
+            </a:r>
+          </a:p>
+          <a:p>
+            <a:r>
+              <a:rPr lang="da-DK" dirty="0"/>
+              <a:t>Asymmetrisk kryptering</a:t>
+            </a:r>
+          </a:p>
+          <a:p>
+            <a:r>
+              <a:rPr lang="da-DK" dirty="0"/>
+              <a:t>Envejsfunktioner og </a:t>
+            </a:r>
+            <a:r>
+              <a:rPr lang="da-DK" dirty="0" err="1"/>
+              <a:t>hashing</a:t>
+            </a:r>
+            <a:endParaRPr lang="da-DK" dirty="0"/>
+          </a:p>
+          <a:p>
+            <a:endParaRPr lang="da-DK" dirty="0"/>
+          </a:p>
+        </p:txBody>
+      </p:sp>
+    </p:spTree>
+    <p:extLst>
+      <p:ext uri="{BB962C8B-B14F-4D97-AF65-F5344CB8AC3E}">
+        <p14:creationId xmlns:p14="http://schemas.microsoft.com/office/powerpoint/2010/main" val="601381868"/>
+      </p:ext>
+    </p:extLst>
+  </p:cSld>
+  <p:clrMapOvr>
+    <a:masterClrMapping/>
+  </p:clrMapOvr>
+</p:sld>
+</file>
+
+<file path=ppt/slides/slide21.xml><?xml version="1.0" encoding="utf-8"?>
 <p:sld xmlns:a="http://schemas.openxmlformats.org/drawingml/2006/main" xmlns:r="http://schemas.openxmlformats.org/officeDocument/2006/relationships" xmlns:p="http://schemas.openxmlformats.org/presentationml/2006/main">
   <p:cSld>
     <p:spTree>
@@ -5162,7 +5283,7 @@
 </p:sld>
 </file>
 
-<file path=ppt/slides/slide21.xml><?xml version="1.0" encoding="utf-8"?>
+<file path=ppt/slides/slide22.xml><?xml version="1.0" encoding="utf-8"?>
 <p:sld xmlns:a="http://schemas.openxmlformats.org/drawingml/2006/main" xmlns:r="http://schemas.openxmlformats.org/officeDocument/2006/relationships" xmlns:p="http://schemas.openxmlformats.org/presentationml/2006/main">
   <p:cSld>
     <p:spTree>
@@ -5195,6 +5316,80 @@
           <a:lstStyle/>
           <a:p>
             <a:r>
+              <a:rPr lang="da-DK" dirty="0"/>
+              <a:t>SSL/HTTPS</a:t>
+            </a:r>
+          </a:p>
+        </p:txBody>
+      </p:sp>
+      <p:sp>
+        <p:nvSpPr>
+          <p:cNvPr id="3" name="Pladsholder til indhold 2"/>
+          <p:cNvSpPr>
+            <a:spLocks noGrp="1"/>
+          </p:cNvSpPr>
+          <p:nvPr>
+            <p:ph idx="1"/>
+          </p:nvPr>
+        </p:nvSpPr>
+        <p:spPr/>
+        <p:txBody>
+          <a:bodyPr/>
+          <a:lstStyle/>
+          <a:p>
+            <a:r>
+              <a:rPr lang="da-DK" dirty="0"/>
+              <a:t>[Indsæt billede af hængelåsen]</a:t>
+            </a:r>
+          </a:p>
+        </p:txBody>
+      </p:sp>
+    </p:spTree>
+    <p:extLst>
+      <p:ext uri="{BB962C8B-B14F-4D97-AF65-F5344CB8AC3E}">
+        <p14:creationId xmlns:p14="http://schemas.microsoft.com/office/powerpoint/2010/main" val="2514145635"/>
+      </p:ext>
+    </p:extLst>
+  </p:cSld>
+  <p:clrMapOvr>
+    <a:masterClrMapping/>
+  </p:clrMapOvr>
+</p:sld>
+</file>
+
+<file path=ppt/slides/slide23.xml><?xml version="1.0" encoding="utf-8"?>
+<p:sld xmlns:a="http://schemas.openxmlformats.org/drawingml/2006/main" xmlns:r="http://schemas.openxmlformats.org/officeDocument/2006/relationships" xmlns:p="http://schemas.openxmlformats.org/presentationml/2006/main">
+  <p:cSld>
+    <p:spTree>
+      <p:nvGrpSpPr>
+        <p:cNvPr id="1" name=""/>
+        <p:cNvGrpSpPr/>
+        <p:nvPr/>
+      </p:nvGrpSpPr>
+      <p:grpSpPr>
+        <a:xfrm>
+          <a:off x="0" y="0"/>
+          <a:ext cx="0" cy="0"/>
+          <a:chOff x="0" y="0"/>
+          <a:chExt cx="0" cy="0"/>
+        </a:xfrm>
+      </p:grpSpPr>
+      <p:sp>
+        <p:nvSpPr>
+          <p:cNvPr id="2" name="Titel 1"/>
+          <p:cNvSpPr>
+            <a:spLocks noGrp="1"/>
+          </p:cNvSpPr>
+          <p:nvPr>
+            <p:ph type="title"/>
+          </p:nvPr>
+        </p:nvSpPr>
+        <p:spPr/>
+        <p:txBody>
+          <a:bodyPr/>
+          <a:lstStyle/>
+          <a:p>
+            <a:r>
               <a:rPr lang="da-DK" dirty="0" err="1"/>
               <a:t>Diffie-Hellman</a:t>
             </a:r>
@@ -5273,7 +5468,7 @@
 </p:sld>
 </file>
 
-<file path=ppt/slides/slide22.xml><?xml version="1.0" encoding="utf-8"?>
+<file path=ppt/slides/slide24.xml><?xml version="1.0" encoding="utf-8"?>
 <p:sld xmlns:a="http://schemas.openxmlformats.org/drawingml/2006/main" xmlns:r="http://schemas.openxmlformats.org/officeDocument/2006/relationships" xmlns:p="http://schemas.openxmlformats.org/presentationml/2006/main">
   <p:cSld>
     <p:spTree>
@@ -5415,7 +5610,7 @@
 </p:sld>
 </file>
 
-<file path=ppt/slides/slide23.xml><?xml version="1.0" encoding="utf-8"?>
+<file path=ppt/slides/slide25.xml><?xml version="1.0" encoding="utf-8"?>
 <p:sld xmlns:a="http://schemas.openxmlformats.org/drawingml/2006/main" xmlns:r="http://schemas.openxmlformats.org/officeDocument/2006/relationships" xmlns:p="http://schemas.openxmlformats.org/presentationml/2006/main">
   <p:cSld>
     <p:spTree>
@@ -5680,7 +5875,7 @@
 </p:sld>
 </file>
 
-<file path=ppt/slides/slide24.xml><?xml version="1.0" encoding="utf-8"?>
+<file path=ppt/slides/slide26.xml><?xml version="1.0" encoding="utf-8"?>
 <p:sld xmlns:a="http://schemas.openxmlformats.org/drawingml/2006/main" xmlns:r="http://schemas.openxmlformats.org/officeDocument/2006/relationships" xmlns:p="http://schemas.openxmlformats.org/presentationml/2006/main">
   <p:cSld>
     <p:spTree>
@@ -5777,7 +5972,15 @@
           <a:p>
             <a:r>
               <a:rPr lang="da-DK" dirty="0"/>
-              <a:t>Man tilføjer et tilfældigt tal til hver beregning, kaldet salt, for at undgå at man kan gætte passwords. </a:t>
+              <a:t>Man tilføjer et tilfældigt tal til hver beregning, kaldet </a:t>
+            </a:r>
+            <a:r>
+              <a:rPr lang="da-DK" b="1" dirty="0"/>
+              <a:t>salt</a:t>
+            </a:r>
+            <a:r>
+              <a:rPr lang="da-DK" dirty="0"/>
+              <a:t>, for at undgå at man kan gætte passwords. </a:t>
             </a:r>
           </a:p>
         </p:txBody>
@@ -5795,7 +5998,7 @@
 </p:sld>
 </file>
 
-<file path=ppt/slides/slide25.xml><?xml version="1.0" encoding="utf-8"?>
+<file path=ppt/slides/slide27.xml><?xml version="1.0" encoding="utf-8"?>
 <p:sld xmlns:a="http://schemas.openxmlformats.org/drawingml/2006/main" xmlns:r="http://schemas.openxmlformats.org/officeDocument/2006/relationships" xmlns:p="http://schemas.openxmlformats.org/presentationml/2006/main">
   <p:cSld>
     <p:spTree>
@@ -6206,251 +6409,6 @@
 </p:sld>
 </file>
 
-<file path=ppt/slides/slide26.xml><?xml version="1.0" encoding="utf-8"?>
-<p:sld xmlns:a="http://schemas.openxmlformats.org/drawingml/2006/main" xmlns:r="http://schemas.openxmlformats.org/officeDocument/2006/relationships" xmlns:p="http://schemas.openxmlformats.org/presentationml/2006/main">
-  <p:cSld>
-    <p:spTree>
-      <p:nvGrpSpPr>
-        <p:cNvPr id="1" name=""/>
-        <p:cNvGrpSpPr/>
-        <p:nvPr/>
-      </p:nvGrpSpPr>
-      <p:grpSpPr>
-        <a:xfrm>
-          <a:off x="0" y="0"/>
-          <a:ext cx="0" cy="0"/>
-          <a:chOff x="0" y="0"/>
-          <a:chExt cx="0" cy="0"/>
-        </a:xfrm>
-      </p:grpSpPr>
-      <p:sp>
-        <p:nvSpPr>
-          <p:cNvPr id="2" name="Titel 1"/>
-          <p:cNvSpPr>
-            <a:spLocks noGrp="1"/>
-          </p:cNvSpPr>
-          <p:nvPr>
-            <p:ph type="title"/>
-          </p:nvPr>
-        </p:nvSpPr>
-        <p:spPr/>
-        <p:txBody>
-          <a:bodyPr/>
-          <a:lstStyle/>
-          <a:p>
-            <a:r>
-              <a:rPr lang="da-DK" dirty="0"/>
-              <a:t>Key </a:t>
-            </a:r>
-            <a:r>
-              <a:rPr lang="da-DK" dirty="0" err="1"/>
-              <a:t>take-away</a:t>
-            </a:r>
-            <a:r>
-              <a:rPr lang="da-DK" dirty="0"/>
-              <a:t> 3</a:t>
-            </a:r>
-          </a:p>
-        </p:txBody>
-      </p:sp>
-      <p:sp>
-        <p:nvSpPr>
-          <p:cNvPr id="3" name="Pladsholder til indhold 2"/>
-          <p:cNvSpPr>
-            <a:spLocks noGrp="1"/>
-          </p:cNvSpPr>
-          <p:nvPr>
-            <p:ph idx="1"/>
-          </p:nvPr>
-        </p:nvSpPr>
-        <p:spPr/>
-        <p:txBody>
-          <a:bodyPr>
-            <a:normAutofit/>
-          </a:bodyPr>
-          <a:lstStyle/>
-          <a:p>
-            <a:pPr marL="0" indent="0">
-              <a:buNone/>
-            </a:pPr>
-            <a:r>
-              <a:rPr lang="da-DK" sz="4400" i="1" dirty="0"/>
-              <a:t>Og Herren sagde til Abraham: </a:t>
-            </a:r>
-          </a:p>
-          <a:p>
-            <a:pPr marL="0" indent="0">
-              <a:buNone/>
-            </a:pPr>
-            <a:r>
-              <a:rPr lang="da-DK" sz="4400" i="1" dirty="0"/>
-              <a:t>”Du skal altid </a:t>
-            </a:r>
-            <a:r>
-              <a:rPr lang="da-DK" sz="4400" i="1" dirty="0" err="1"/>
-              <a:t>hashe</a:t>
-            </a:r>
-            <a:r>
-              <a:rPr lang="da-DK" sz="4400" i="1" dirty="0"/>
-              <a:t> dine brugeres passwords. I tilgift skal du altid sørge for at tilføje salt med en passende mængde bits, thi at de som vil skade dig ikke skal hacke dine systemer. ”</a:t>
-            </a:r>
-          </a:p>
-        </p:txBody>
-      </p:sp>
-    </p:spTree>
-    <p:extLst>
-      <p:ext uri="{BB962C8B-B14F-4D97-AF65-F5344CB8AC3E}">
-        <p14:creationId xmlns:p14="http://schemas.microsoft.com/office/powerpoint/2010/main" val="767892953"/>
-      </p:ext>
-    </p:extLst>
-  </p:cSld>
-  <p:clrMapOvr>
-    <a:masterClrMapping/>
-  </p:clrMapOvr>
-</p:sld>
-</file>
-
-<file path=ppt/slides/slide27.xml><?xml version="1.0" encoding="utf-8"?>
-<p:sld xmlns:a="http://schemas.openxmlformats.org/drawingml/2006/main" xmlns:r="http://schemas.openxmlformats.org/officeDocument/2006/relationships" xmlns:p="http://schemas.openxmlformats.org/presentationml/2006/main">
-  <p:cSld>
-    <p:spTree>
-      <p:nvGrpSpPr>
-        <p:cNvPr id="1" name=""/>
-        <p:cNvGrpSpPr/>
-        <p:nvPr/>
-      </p:nvGrpSpPr>
-      <p:grpSpPr>
-        <a:xfrm>
-          <a:off x="0" y="0"/>
-          <a:ext cx="0" cy="0"/>
-          <a:chOff x="0" y="0"/>
-          <a:chExt cx="0" cy="0"/>
-        </a:xfrm>
-      </p:grpSpPr>
-      <p:sp>
-        <p:nvSpPr>
-          <p:cNvPr id="2" name="Titel 1"/>
-          <p:cNvSpPr>
-            <a:spLocks noGrp="1"/>
-          </p:cNvSpPr>
-          <p:nvPr>
-            <p:ph type="title"/>
-          </p:nvPr>
-        </p:nvSpPr>
-        <p:spPr/>
-        <p:txBody>
-          <a:bodyPr/>
-          <a:lstStyle/>
-          <a:p>
-            <a:r>
-              <a:rPr lang="da-DK" dirty="0"/>
-              <a:t>Adgangskontrol</a:t>
-            </a:r>
-          </a:p>
-        </p:txBody>
-      </p:sp>
-      <p:sp>
-        <p:nvSpPr>
-          <p:cNvPr id="3" name="Pladsholder til indhold 2"/>
-          <p:cNvSpPr>
-            <a:spLocks noGrp="1"/>
-          </p:cNvSpPr>
-          <p:nvPr>
-            <p:ph idx="1"/>
-          </p:nvPr>
-        </p:nvSpPr>
-        <p:spPr/>
-        <p:txBody>
-          <a:bodyPr/>
-          <a:lstStyle/>
-          <a:p>
-            <a:pPr algn="just"/>
-            <a:r>
-              <a:rPr lang="da-DK" dirty="0"/>
-              <a:t>Adgangskontrol handler om at holde styr på </a:t>
-            </a:r>
-            <a:r>
-              <a:rPr lang="da-DK" i="1" dirty="0"/>
-              <a:t>hvem </a:t>
-            </a:r>
-            <a:r>
-              <a:rPr lang="da-DK" dirty="0"/>
-              <a:t>der har adgang til ens system, samt </a:t>
-            </a:r>
-            <a:r>
-              <a:rPr lang="da-DK" i="1" dirty="0"/>
-              <a:t>hvad</a:t>
-            </a:r>
-            <a:r>
-              <a:rPr lang="da-DK" dirty="0"/>
-              <a:t> de må/kan gøre. </a:t>
-            </a:r>
-          </a:p>
-          <a:p>
-            <a:pPr algn="just"/>
-            <a:r>
-              <a:rPr lang="da-DK" dirty="0"/>
-              <a:t>For at holde styr på hvem der logger på kan man fx bruge passwords og </a:t>
-            </a:r>
-            <a:r>
-              <a:rPr lang="da-DK" dirty="0" err="1"/>
-              <a:t>two</a:t>
-            </a:r>
-            <a:r>
-              <a:rPr lang="da-DK" dirty="0"/>
-              <a:t>-factor autentificering (</a:t>
-            </a:r>
-            <a:r>
-              <a:rPr lang="da-DK" dirty="0" err="1"/>
-              <a:t>Verified</a:t>
-            </a:r>
-            <a:r>
-              <a:rPr lang="da-DK" dirty="0"/>
-              <a:t> by Visa, NemID). </a:t>
-            </a:r>
-          </a:p>
-          <a:p>
-            <a:pPr algn="just"/>
-            <a:r>
-              <a:rPr lang="da-DK" dirty="0"/>
-              <a:t>En ret almindelig måde at holde styr på hvem der har lov til at gøre hvad er filbaserede tilladelse (</a:t>
-            </a:r>
-            <a:r>
-              <a:rPr lang="da-DK" dirty="0" err="1"/>
-              <a:t>windows</a:t>
-            </a:r>
-            <a:r>
-              <a:rPr lang="da-DK" dirty="0"/>
-              <a:t>, </a:t>
-            </a:r>
-            <a:r>
-              <a:rPr lang="da-DK" dirty="0" err="1"/>
-              <a:t>linux</a:t>
-            </a:r>
-            <a:r>
-              <a:rPr lang="da-DK" dirty="0"/>
-              <a:t>). </a:t>
-            </a:r>
-          </a:p>
-          <a:p>
-            <a:pPr algn="just"/>
-            <a:endParaRPr lang="da-DK" dirty="0"/>
-          </a:p>
-        </p:txBody>
-      </p:sp>
-    </p:spTree>
-    <p:extLst>
-      <p:ext uri="{BB962C8B-B14F-4D97-AF65-F5344CB8AC3E}">
-        <p14:creationId xmlns:p14="http://schemas.microsoft.com/office/powerpoint/2010/main" val="724018253"/>
-      </p:ext>
-    </p:extLst>
-  </p:cSld>
-  <p:clrMapOvr>
-    <a:masterClrMapping/>
-  </p:clrMapOvr>
-</p:sld>
-</file>
-
 <file path=ppt/slides/slide28.xml><?xml version="1.0" encoding="utf-8"?>
 <p:sld xmlns:a="http://schemas.openxmlformats.org/drawingml/2006/main" xmlns:r="http://schemas.openxmlformats.org/officeDocument/2006/relationships" xmlns:p="http://schemas.openxmlformats.org/presentationml/2006/main">
   <p:cSld>
@@ -6485,7 +6443,15 @@
           <a:p>
             <a:r>
               <a:rPr lang="da-DK" dirty="0"/>
-              <a:t>Filbaserede tilladelser</a:t>
+              <a:t>Key </a:t>
+            </a:r>
+            <a:r>
+              <a:rPr lang="da-DK" dirty="0" err="1"/>
+              <a:t>take-away</a:t>
+            </a:r>
+            <a:r>
+              <a:rPr lang="da-DK" dirty="0"/>
+              <a:t> 3</a:t>
             </a:r>
           </a:p>
         </p:txBody>
@@ -6502,30 +6468,34 @@
         </p:nvSpPr>
         <p:spPr/>
         <p:txBody>
-          <a:bodyPr/>
-          <a:lstStyle/>
-          <a:p>
-            <a:r>
-              <a:rPr lang="da-DK" dirty="0"/>
-              <a:t>Der findes forskellige modeller, men fælles er typisk: </a:t>
-            </a:r>
-          </a:p>
-          <a:p>
-            <a:r>
-              <a:rPr lang="da-DK" dirty="0"/>
-              <a:t>Brugere autoriseres enten som dem selv eller som medlemmer af en gruppe. </a:t>
-            </a:r>
-          </a:p>
-          <a:p>
-            <a:r>
-              <a:rPr lang="da-DK" dirty="0"/>
-              <a:t>Der gives tilladelse til læsning, skrivning og eksekvering (kørsel). </a:t>
-            </a:r>
-          </a:p>
-          <a:p>
-            <a:r>
-              <a:rPr lang="da-DK" dirty="0"/>
-              <a:t>Når et program tilgår en fil, tjekker operativsystemet om den bruger, som programmet tilhører, har ret til at udføre den ønskede handling. </a:t>
+          <a:bodyPr>
+            <a:normAutofit/>
+          </a:bodyPr>
+          <a:lstStyle/>
+          <a:p>
+            <a:pPr marL="0" indent="0">
+              <a:buNone/>
+            </a:pPr>
+            <a:r>
+              <a:rPr lang="da-DK" sz="4400" i="1" dirty="0"/>
+              <a:t>Og Herren sagde til Abraham: </a:t>
+            </a:r>
+          </a:p>
+          <a:p>
+            <a:pPr marL="0" indent="0">
+              <a:buNone/>
+            </a:pPr>
+            <a:r>
+              <a:rPr lang="da-DK" sz="4400" i="1" dirty="0"/>
+              <a:t>”Du skal altid </a:t>
+            </a:r>
+            <a:r>
+              <a:rPr lang="da-DK" sz="4400" i="1" dirty="0" err="1"/>
+              <a:t>hashe</a:t>
+            </a:r>
+            <a:r>
+              <a:rPr lang="da-DK" sz="4400" i="1" dirty="0"/>
+              <a:t> dine brugeres passwords. I tilgift skal du altid sørge for at tilføje salt med en passende mængde bits, thi at de som vil skade dig ikke skal hacke dine systemer. ”</a:t>
             </a:r>
           </a:p>
         </p:txBody>
@@ -6533,7 +6503,7 @@
     </p:spTree>
     <p:extLst>
       <p:ext uri="{BB962C8B-B14F-4D97-AF65-F5344CB8AC3E}">
-        <p14:creationId xmlns:p14="http://schemas.microsoft.com/office/powerpoint/2010/main" val="688961286"/>
+        <p14:creationId xmlns:p14="http://schemas.microsoft.com/office/powerpoint/2010/main" val="767892953"/>
       </p:ext>
     </p:extLst>
   </p:cSld>
@@ -6577,7 +6547,15 @@
           <a:p>
             <a:r>
               <a:rPr lang="da-DK" dirty="0"/>
-              <a:t>Android kodeeksempel</a:t>
+              <a:t>Key </a:t>
+            </a:r>
+            <a:r>
+              <a:rPr lang="da-DK" dirty="0" err="1"/>
+              <a:t>take-away</a:t>
+            </a:r>
+            <a:r>
+              <a:rPr lang="da-DK" dirty="0"/>
+              <a:t> 3</a:t>
             </a:r>
           </a:p>
         </p:txBody>
@@ -6594,41 +6572,50 @@
         </p:nvSpPr>
         <p:spPr/>
         <p:txBody>
-          <a:bodyPr/>
+          <a:bodyPr>
+            <a:normAutofit/>
+          </a:bodyPr>
           <a:lstStyle/>
           <a:p>
             <a:pPr marL="0" indent="0">
               <a:buNone/>
             </a:pPr>
             <a:r>
-              <a:rPr lang="da-DK" dirty="0">
-                <a:hlinkClick r:id="rId2"/>
-              </a:rPr>
-              <a:t>https://github.com/philipkaare/encrypto_sample</a:t>
-            </a:r>
-            <a:endParaRPr lang="da-DK" dirty="0"/>
+              <a:rPr lang="da-DK" sz="4400" i="1" dirty="0"/>
+              <a:t>Og Herren sagde til Abraham: </a:t>
+            </a:r>
           </a:p>
           <a:p>
             <a:pPr marL="0" indent="0">
               <a:buNone/>
             </a:pPr>
-            <a:endParaRPr lang="en-US" dirty="0"/>
-          </a:p>
-          <a:p>
-            <a:pPr marL="0" indent="0">
-              <a:buNone/>
-            </a:pPr>
-            <a:r>
-              <a:rPr lang="en-US" dirty="0"/>
-              <a:t>L</a:t>
-            </a:r>
-            <a:r>
-              <a:rPr lang="da-DK" dirty="0" err="1"/>
-              <a:t>æs</a:t>
-            </a:r>
-            <a:r>
-              <a:rPr lang="da-DK" dirty="0"/>
-              <a:t> README</a:t>
+            <a:r>
+              <a:rPr lang="da-DK" sz="4400" i="1" dirty="0"/>
+              <a:t>”Du skal altid </a:t>
+            </a:r>
+            <a:r>
+              <a:rPr lang="da-DK" sz="4400" b="1" i="1" dirty="0" err="1"/>
+              <a:t>hashe</a:t>
+            </a:r>
+            <a:r>
+              <a:rPr lang="da-DK" sz="4400" i="1" dirty="0"/>
+              <a:t> dine brugeres passwords. I tilgift skal du altid sørge for at tilføje </a:t>
+            </a:r>
+            <a:r>
+              <a:rPr lang="da-DK" sz="4400" b="1" i="1" dirty="0"/>
+              <a:t>salt</a:t>
+            </a:r>
+            <a:r>
+              <a:rPr lang="da-DK" sz="4400" i="1" dirty="0"/>
+              <a:t> med en passende mængde </a:t>
+            </a:r>
+            <a:r>
+              <a:rPr lang="da-DK" sz="4400" b="1" i="1" dirty="0"/>
+              <a:t>bits</a:t>
+            </a:r>
+            <a:r>
+              <a:rPr lang="da-DK" sz="4400" i="1" dirty="0"/>
+              <a:t>, thi at de som vil skade dig ikke skal hacke dine systemer. ”</a:t>
             </a:r>
           </a:p>
         </p:txBody>
@@ -6636,7 +6623,7 @@
     </p:spTree>
     <p:extLst>
       <p:ext uri="{BB962C8B-B14F-4D97-AF65-F5344CB8AC3E}">
-        <p14:creationId xmlns:p14="http://schemas.microsoft.com/office/powerpoint/2010/main" val="4181305357"/>
+        <p14:creationId xmlns:p14="http://schemas.microsoft.com/office/powerpoint/2010/main" val="697459703"/>
       </p:ext>
     </p:extLst>
   </p:cSld>
@@ -6781,7 +6768,7 @@
         <p:spPr>
           <a:xfrm>
             <a:off x="6900863" y="1493398"/>
-            <a:ext cx="4857750" cy="1754326"/>
+            <a:ext cx="4857750" cy="3416320"/>
           </a:xfrm>
           <a:prstGeom prst="rect">
             <a:avLst/>
@@ -6796,7 +6783,13 @@
           <a:p>
             <a:r>
               <a:rPr lang="da-DK" sz="3600" dirty="0"/>
-              <a:t>At give en intuition og et overblik over IT-sikkerhedsområdet. </a:t>
+              <a:t>Læringsmål: </a:t>
+            </a:r>
+          </a:p>
+          <a:p>
+            <a:r>
+              <a:rPr lang="da-DK" sz="3600" dirty="0"/>
+              <a:t>Når vi slutter i dag så kender I til alm. Angrebsteknikker, kryptografi og adgangskontrol. </a:t>
             </a:r>
           </a:p>
         </p:txBody>
@@ -6815,6 +6808,348 @@
 </file>
 
 <file path=ppt/slides/slide30.xml><?xml version="1.0" encoding="utf-8"?>
+<p:sld xmlns:a="http://schemas.openxmlformats.org/drawingml/2006/main" xmlns:r="http://schemas.openxmlformats.org/officeDocument/2006/relationships" xmlns:p="http://schemas.openxmlformats.org/presentationml/2006/main">
+  <p:cSld>
+    <p:spTree>
+      <p:nvGrpSpPr>
+        <p:cNvPr id="1" name=""/>
+        <p:cNvGrpSpPr/>
+        <p:nvPr/>
+      </p:nvGrpSpPr>
+      <p:grpSpPr>
+        <a:xfrm>
+          <a:off x="0" y="0"/>
+          <a:ext cx="0" cy="0"/>
+          <a:chOff x="0" y="0"/>
+          <a:chExt cx="0" cy="0"/>
+        </a:xfrm>
+      </p:grpSpPr>
+      <p:sp>
+        <p:nvSpPr>
+          <p:cNvPr id="2" name="Titel 1"/>
+          <p:cNvSpPr>
+            <a:spLocks noGrp="1"/>
+          </p:cNvSpPr>
+          <p:nvPr>
+            <p:ph type="title"/>
+          </p:nvPr>
+        </p:nvSpPr>
+        <p:spPr/>
+        <p:txBody>
+          <a:bodyPr/>
+          <a:lstStyle/>
+          <a:p>
+            <a:r>
+              <a:rPr lang="da-DK" dirty="0"/>
+              <a:t>Adgangskontrol</a:t>
+            </a:r>
+          </a:p>
+        </p:txBody>
+      </p:sp>
+      <p:sp>
+        <p:nvSpPr>
+          <p:cNvPr id="3" name="Pladsholder til indhold 2"/>
+          <p:cNvSpPr>
+            <a:spLocks noGrp="1"/>
+          </p:cNvSpPr>
+          <p:nvPr>
+            <p:ph idx="1"/>
+          </p:nvPr>
+        </p:nvSpPr>
+        <p:spPr/>
+        <p:txBody>
+          <a:bodyPr/>
+          <a:lstStyle/>
+          <a:p>
+            <a:pPr algn="just"/>
+            <a:r>
+              <a:rPr lang="da-DK" dirty="0"/>
+              <a:t>Adgangskontrol handler om at holde styr på </a:t>
+            </a:r>
+            <a:r>
+              <a:rPr lang="da-DK" i="1" dirty="0"/>
+              <a:t>hvem </a:t>
+            </a:r>
+            <a:r>
+              <a:rPr lang="da-DK" dirty="0"/>
+              <a:t>der har adgang til ens system, samt </a:t>
+            </a:r>
+            <a:r>
+              <a:rPr lang="da-DK" i="1" dirty="0"/>
+              <a:t>hvad</a:t>
+            </a:r>
+            <a:r>
+              <a:rPr lang="da-DK" dirty="0"/>
+              <a:t> de må/kan gøre. </a:t>
+            </a:r>
+          </a:p>
+          <a:p>
+            <a:pPr algn="just"/>
+            <a:r>
+              <a:rPr lang="da-DK" dirty="0"/>
+              <a:t>For at holde styr på hvem der logger på kan man fx bruge passwords og </a:t>
+            </a:r>
+            <a:r>
+              <a:rPr lang="da-DK" dirty="0" err="1"/>
+              <a:t>two</a:t>
+            </a:r>
+            <a:r>
+              <a:rPr lang="da-DK" dirty="0"/>
+              <a:t>-factor autentificering (</a:t>
+            </a:r>
+            <a:r>
+              <a:rPr lang="da-DK" dirty="0" err="1"/>
+              <a:t>Verified</a:t>
+            </a:r>
+            <a:r>
+              <a:rPr lang="da-DK" dirty="0"/>
+              <a:t> by Visa, NemID). </a:t>
+            </a:r>
+          </a:p>
+          <a:p>
+            <a:pPr algn="just"/>
+            <a:r>
+              <a:rPr lang="da-DK" dirty="0"/>
+              <a:t>En ret almindelig måde at holde styr på hvem der har lov til at gøre hvad er filbaserede tilladelse (</a:t>
+            </a:r>
+            <a:r>
+              <a:rPr lang="da-DK" dirty="0" err="1"/>
+              <a:t>windows</a:t>
+            </a:r>
+            <a:r>
+              <a:rPr lang="da-DK" dirty="0"/>
+              <a:t>, </a:t>
+            </a:r>
+            <a:r>
+              <a:rPr lang="da-DK" dirty="0" err="1"/>
+              <a:t>linux</a:t>
+            </a:r>
+            <a:r>
+              <a:rPr lang="da-DK" dirty="0"/>
+              <a:t>). </a:t>
+            </a:r>
+          </a:p>
+          <a:p>
+            <a:pPr algn="just"/>
+            <a:endParaRPr lang="da-DK" dirty="0"/>
+          </a:p>
+        </p:txBody>
+      </p:sp>
+    </p:spTree>
+    <p:extLst>
+      <p:ext uri="{BB962C8B-B14F-4D97-AF65-F5344CB8AC3E}">
+        <p14:creationId xmlns:p14="http://schemas.microsoft.com/office/powerpoint/2010/main" val="724018253"/>
+      </p:ext>
+    </p:extLst>
+  </p:cSld>
+  <p:clrMapOvr>
+    <a:masterClrMapping/>
+  </p:clrMapOvr>
+</p:sld>
+</file>
+
+<file path=ppt/slides/slide31.xml><?xml version="1.0" encoding="utf-8"?>
+<p:sld xmlns:a="http://schemas.openxmlformats.org/drawingml/2006/main" xmlns:r="http://schemas.openxmlformats.org/officeDocument/2006/relationships" xmlns:p="http://schemas.openxmlformats.org/presentationml/2006/main">
+  <p:cSld>
+    <p:spTree>
+      <p:nvGrpSpPr>
+        <p:cNvPr id="1" name=""/>
+        <p:cNvGrpSpPr/>
+        <p:nvPr/>
+      </p:nvGrpSpPr>
+      <p:grpSpPr>
+        <a:xfrm>
+          <a:off x="0" y="0"/>
+          <a:ext cx="0" cy="0"/>
+          <a:chOff x="0" y="0"/>
+          <a:chExt cx="0" cy="0"/>
+        </a:xfrm>
+      </p:grpSpPr>
+      <p:sp>
+        <p:nvSpPr>
+          <p:cNvPr id="2" name="Titel 1"/>
+          <p:cNvSpPr>
+            <a:spLocks noGrp="1"/>
+          </p:cNvSpPr>
+          <p:nvPr>
+            <p:ph type="title"/>
+          </p:nvPr>
+        </p:nvSpPr>
+        <p:spPr/>
+        <p:txBody>
+          <a:bodyPr/>
+          <a:lstStyle/>
+          <a:p>
+            <a:r>
+              <a:rPr lang="da-DK" dirty="0" err="1"/>
+              <a:t>Two</a:t>
+            </a:r>
+            <a:r>
+              <a:rPr lang="da-DK" dirty="0"/>
+              <a:t>-factor</a:t>
+            </a:r>
+          </a:p>
+        </p:txBody>
+      </p:sp>
+      <p:sp>
+        <p:nvSpPr>
+          <p:cNvPr id="3" name="Pladsholder til indhold 2"/>
+          <p:cNvSpPr>
+            <a:spLocks noGrp="1"/>
+          </p:cNvSpPr>
+          <p:nvPr>
+            <p:ph idx="1"/>
+          </p:nvPr>
+        </p:nvSpPr>
+        <p:spPr/>
+        <p:txBody>
+          <a:bodyPr/>
+          <a:lstStyle/>
+          <a:p>
+            <a:r>
+              <a:rPr lang="da-DK" dirty="0"/>
+              <a:t>Hvad er det?</a:t>
+            </a:r>
+          </a:p>
+          <a:p>
+            <a:r>
+              <a:rPr lang="da-DK" dirty="0"/>
+              <a:t>Hvorfor? </a:t>
+            </a:r>
+          </a:p>
+          <a:p>
+            <a:r>
+              <a:rPr lang="da-DK" dirty="0"/>
+              <a:t>Hvad er mulige </a:t>
+            </a:r>
+            <a:r>
+              <a:rPr lang="da-DK" dirty="0" err="1"/>
+              <a:t>riscisi</a:t>
+            </a:r>
+            <a:r>
+              <a:rPr lang="da-DK" dirty="0"/>
+              <a:t>?</a:t>
+            </a:r>
+          </a:p>
+        </p:txBody>
+      </p:sp>
+    </p:spTree>
+    <p:extLst>
+      <p:ext uri="{BB962C8B-B14F-4D97-AF65-F5344CB8AC3E}">
+        <p14:creationId xmlns:p14="http://schemas.microsoft.com/office/powerpoint/2010/main" val="688961286"/>
+      </p:ext>
+    </p:extLst>
+  </p:cSld>
+  <p:clrMapOvr>
+    <a:masterClrMapping/>
+  </p:clrMapOvr>
+</p:sld>
+</file>
+
+<file path=ppt/slides/slide32.xml><?xml version="1.0" encoding="utf-8"?>
+<p:sld xmlns:a="http://schemas.openxmlformats.org/drawingml/2006/main" xmlns:r="http://schemas.openxmlformats.org/officeDocument/2006/relationships" xmlns:p="http://schemas.openxmlformats.org/presentationml/2006/main">
+  <p:cSld>
+    <p:spTree>
+      <p:nvGrpSpPr>
+        <p:cNvPr id="1" name=""/>
+        <p:cNvGrpSpPr/>
+        <p:nvPr/>
+      </p:nvGrpSpPr>
+      <p:grpSpPr>
+        <a:xfrm>
+          <a:off x="0" y="0"/>
+          <a:ext cx="0" cy="0"/>
+          <a:chOff x="0" y="0"/>
+          <a:chExt cx="0" cy="0"/>
+        </a:xfrm>
+      </p:grpSpPr>
+      <p:sp>
+        <p:nvSpPr>
+          <p:cNvPr id="2" name="Titel 1"/>
+          <p:cNvSpPr>
+            <a:spLocks noGrp="1"/>
+          </p:cNvSpPr>
+          <p:nvPr>
+            <p:ph type="title"/>
+          </p:nvPr>
+        </p:nvSpPr>
+        <p:spPr/>
+        <p:txBody>
+          <a:bodyPr/>
+          <a:lstStyle/>
+          <a:p>
+            <a:r>
+              <a:rPr lang="da-DK" dirty="0"/>
+              <a:t>Android kodeeksempel</a:t>
+            </a:r>
+          </a:p>
+        </p:txBody>
+      </p:sp>
+      <p:sp>
+        <p:nvSpPr>
+          <p:cNvPr id="3" name="Pladsholder til indhold 2"/>
+          <p:cNvSpPr>
+            <a:spLocks noGrp="1"/>
+          </p:cNvSpPr>
+          <p:nvPr>
+            <p:ph idx="1"/>
+          </p:nvPr>
+        </p:nvSpPr>
+        <p:spPr/>
+        <p:txBody>
+          <a:bodyPr/>
+          <a:lstStyle/>
+          <a:p>
+            <a:pPr marL="0" indent="0">
+              <a:buNone/>
+            </a:pPr>
+            <a:r>
+              <a:rPr lang="da-DK" dirty="0">
+                <a:hlinkClick r:id="rId2"/>
+              </a:rPr>
+              <a:t>https://github.com/philipkaare/encrypto_sample</a:t>
+            </a:r>
+            <a:endParaRPr lang="da-DK" dirty="0"/>
+          </a:p>
+          <a:p>
+            <a:pPr marL="0" indent="0">
+              <a:buNone/>
+            </a:pPr>
+            <a:endParaRPr lang="en-US" dirty="0"/>
+          </a:p>
+          <a:p>
+            <a:pPr marL="0" indent="0">
+              <a:buNone/>
+            </a:pPr>
+            <a:r>
+              <a:rPr lang="en-US" dirty="0"/>
+              <a:t>L</a:t>
+            </a:r>
+            <a:r>
+              <a:rPr lang="da-DK" dirty="0" err="1"/>
+              <a:t>æs</a:t>
+            </a:r>
+            <a:r>
+              <a:rPr lang="da-DK" dirty="0"/>
+              <a:t> README!</a:t>
+            </a:r>
+          </a:p>
+        </p:txBody>
+      </p:sp>
+    </p:spTree>
+    <p:extLst>
+      <p:ext uri="{BB962C8B-B14F-4D97-AF65-F5344CB8AC3E}">
+        <p14:creationId xmlns:p14="http://schemas.microsoft.com/office/powerpoint/2010/main" val="4181305357"/>
+      </p:ext>
+    </p:extLst>
+  </p:cSld>
+  <p:clrMapOvr>
+    <a:masterClrMapping/>
+  </p:clrMapOvr>
+</p:sld>
+</file>
+
+<file path=ppt/slides/slide33.xml><?xml version="1.0" encoding="utf-8"?>
 <p:sld xmlns:a="http://schemas.openxmlformats.org/drawingml/2006/main" xmlns:r="http://schemas.openxmlformats.org/officeDocument/2006/relationships" xmlns:p="http://schemas.openxmlformats.org/presentationml/2006/main">
   <p:cSld>
     <p:spTree>
@@ -7804,6 +8139,7 @@
               <a:rPr lang="da-DK" dirty="0"/>
               <a:t>Organisatoriske/menneskelige angrebspunkter</a:t>
             </a:r>
+            <a:endParaRPr lang="da-DK" dirty="0"/>
           </a:p>
         </p:txBody>
       </p:sp>
@@ -7824,57 +8160,7 @@
           <a:p>
             <a:r>
               <a:rPr lang="da-DK" dirty="0"/>
-              <a:t>Der er mange </a:t>
-            </a:r>
-            <a:r>
-              <a:rPr lang="da-DK" dirty="0">
-                <a:sym typeface="Wingdings" panose="05000000000000000000" pitchFamily="2" charset="2"/>
-              </a:rPr>
-              <a:t></a:t>
-            </a:r>
-          </a:p>
-          <a:p>
-            <a:r>
-              <a:rPr lang="da-DK" dirty="0">
-                <a:sym typeface="Wingdings" panose="05000000000000000000" pitchFamily="2" charset="2"/>
-              </a:rPr>
-              <a:t>De organisatoriske angreb er generelt en form for social </a:t>
-            </a:r>
-            <a:r>
-              <a:rPr lang="da-DK" dirty="0" err="1">
-                <a:sym typeface="Wingdings" panose="05000000000000000000" pitchFamily="2" charset="2"/>
-              </a:rPr>
-              <a:t>engineering</a:t>
-            </a:r>
-            <a:endParaRPr lang="da-DK" dirty="0">
-              <a:sym typeface="Wingdings" panose="05000000000000000000" pitchFamily="2" charset="2"/>
-            </a:endParaRPr>
-          </a:p>
-          <a:p>
-            <a:r>
-              <a:rPr lang="da-DK" dirty="0" err="1"/>
-              <a:t>Tailgating</a:t>
-            </a:r>
-            <a:endParaRPr lang="da-DK" dirty="0"/>
-          </a:p>
-          <a:p>
-            <a:r>
-              <a:rPr lang="da-DK" dirty="0"/>
-              <a:t>Forstillelse (</a:t>
-            </a:r>
-            <a:r>
-              <a:rPr lang="da-DK" dirty="0" err="1"/>
-              <a:t>impersonation</a:t>
-            </a:r>
-            <a:r>
-              <a:rPr lang="da-DK" dirty="0"/>
-              <a:t>)</a:t>
-            </a:r>
-          </a:p>
-          <a:p>
-            <a:r>
-              <a:rPr lang="da-DK" dirty="0"/>
-              <a:t>Identitetstyveri</a:t>
+              <a:t>Diskuter i 2 min. 2 eksempler Med sidemanden hvad nogle organisatoriske eller menneskelige angrebspunkter kunne være. </a:t>
             </a:r>
           </a:p>
         </p:txBody>
@@ -7882,7 +8168,7 @@
     </p:spTree>
     <p:extLst>
       <p:ext uri="{BB962C8B-B14F-4D97-AF65-F5344CB8AC3E}">
-        <p14:creationId xmlns:p14="http://schemas.microsoft.com/office/powerpoint/2010/main" val="3223428623"/>
+        <p14:creationId xmlns:p14="http://schemas.microsoft.com/office/powerpoint/2010/main" val="1724390402"/>
       </p:ext>
     </p:extLst>
   </p:cSld>

</xml_diff>

<commit_message>
Small fixes here and there.
</commit_message>
<xml_diff>
--- a/KU/IT-sikkerhed.pptx
+++ b/KU/IT-sikkerhed.pptx
@@ -273,7 +273,7 @@
           <a:p>
             <a:fld id="{BA224F2B-A767-425E-8374-E42CDBF76FF9}" type="datetimeFigureOut">
               <a:rPr lang="da-DK" smtClean="0"/>
-              <a:t>07-11-2016</a:t>
+              <a:t>15-11-2016</a:t>
             </a:fld>
             <a:endParaRPr lang="da-DK"/>
           </a:p>
@@ -441,7 +441,7 @@
           <a:p>
             <a:fld id="{BA224F2B-A767-425E-8374-E42CDBF76FF9}" type="datetimeFigureOut">
               <a:rPr lang="da-DK" smtClean="0"/>
-              <a:t>07-11-2016</a:t>
+              <a:t>15-11-2016</a:t>
             </a:fld>
             <a:endParaRPr lang="da-DK"/>
           </a:p>
@@ -619,7 +619,7 @@
           <a:p>
             <a:fld id="{BA224F2B-A767-425E-8374-E42CDBF76FF9}" type="datetimeFigureOut">
               <a:rPr lang="da-DK" smtClean="0"/>
-              <a:t>07-11-2016</a:t>
+              <a:t>15-11-2016</a:t>
             </a:fld>
             <a:endParaRPr lang="da-DK"/>
           </a:p>
@@ -787,7 +787,7 @@
           <a:p>
             <a:fld id="{BA224F2B-A767-425E-8374-E42CDBF76FF9}" type="datetimeFigureOut">
               <a:rPr lang="da-DK" smtClean="0"/>
-              <a:t>07-11-2016</a:t>
+              <a:t>15-11-2016</a:t>
             </a:fld>
             <a:endParaRPr lang="da-DK"/>
           </a:p>
@@ -1032,7 +1032,7 @@
           <a:p>
             <a:fld id="{BA224F2B-A767-425E-8374-E42CDBF76FF9}" type="datetimeFigureOut">
               <a:rPr lang="da-DK" smtClean="0"/>
-              <a:t>07-11-2016</a:t>
+              <a:t>15-11-2016</a:t>
             </a:fld>
             <a:endParaRPr lang="da-DK"/>
           </a:p>
@@ -1261,7 +1261,7 @@
           <a:p>
             <a:fld id="{BA224F2B-A767-425E-8374-E42CDBF76FF9}" type="datetimeFigureOut">
               <a:rPr lang="da-DK" smtClean="0"/>
-              <a:t>07-11-2016</a:t>
+              <a:t>15-11-2016</a:t>
             </a:fld>
             <a:endParaRPr lang="da-DK"/>
           </a:p>
@@ -1625,7 +1625,7 @@
           <a:p>
             <a:fld id="{BA224F2B-A767-425E-8374-E42CDBF76FF9}" type="datetimeFigureOut">
               <a:rPr lang="da-DK" smtClean="0"/>
-              <a:t>07-11-2016</a:t>
+              <a:t>15-11-2016</a:t>
             </a:fld>
             <a:endParaRPr lang="da-DK"/>
           </a:p>
@@ -1742,7 +1742,7 @@
           <a:p>
             <a:fld id="{BA224F2B-A767-425E-8374-E42CDBF76FF9}" type="datetimeFigureOut">
               <a:rPr lang="da-DK" smtClean="0"/>
-              <a:t>07-11-2016</a:t>
+              <a:t>15-11-2016</a:t>
             </a:fld>
             <a:endParaRPr lang="da-DK"/>
           </a:p>
@@ -1837,7 +1837,7 @@
           <a:p>
             <a:fld id="{BA224F2B-A767-425E-8374-E42CDBF76FF9}" type="datetimeFigureOut">
               <a:rPr lang="da-DK" smtClean="0"/>
-              <a:t>07-11-2016</a:t>
+              <a:t>15-11-2016</a:t>
             </a:fld>
             <a:endParaRPr lang="da-DK"/>
           </a:p>
@@ -2112,7 +2112,7 @@
           <a:p>
             <a:fld id="{BA224F2B-A767-425E-8374-E42CDBF76FF9}" type="datetimeFigureOut">
               <a:rPr lang="da-DK" smtClean="0"/>
-              <a:t>07-11-2016</a:t>
+              <a:t>15-11-2016</a:t>
             </a:fld>
             <a:endParaRPr lang="da-DK"/>
           </a:p>
@@ -2364,7 +2364,7 @@
           <a:p>
             <a:fld id="{BA224F2B-A767-425E-8374-E42CDBF76FF9}" type="datetimeFigureOut">
               <a:rPr lang="da-DK" smtClean="0"/>
-              <a:t>07-11-2016</a:t>
+              <a:t>15-11-2016</a:t>
             </a:fld>
             <a:endParaRPr lang="da-DK"/>
           </a:p>
@@ -2575,7 +2575,7 @@
           <a:p>
             <a:fld id="{BA224F2B-A767-425E-8374-E42CDBF76FF9}" type="datetimeFigureOut">
               <a:rPr lang="da-DK" smtClean="0"/>
-              <a:t>07-11-2016</a:t>
+              <a:t>15-11-2016</a:t>
             </a:fld>
             <a:endParaRPr lang="da-DK"/>
           </a:p>
@@ -3851,7 +3851,7 @@
             </a:pPr>
             <a:r>
               <a:rPr lang="da-DK" dirty="0"/>
-              <a:t>Nøglen er matrixens størrelse 5x5, </a:t>
+              <a:t>Nøglen er matrixens størrelse 6x5, </a:t>
             </a:r>
           </a:p>
           <a:p>
@@ -5317,29 +5317,259 @@
           <a:p>
             <a:r>
               <a:rPr lang="da-DK" dirty="0"/>
-              <a:t>SSL/HTTPS</a:t>
-            </a:r>
-          </a:p>
-        </p:txBody>
-      </p:sp>
-      <p:sp>
-        <p:nvSpPr>
-          <p:cNvPr id="3" name="Pladsholder til indhold 2"/>
-          <p:cNvSpPr>
-            <a:spLocks noGrp="1"/>
-          </p:cNvSpPr>
-          <p:nvPr>
-            <p:ph idx="1"/>
-          </p:nvPr>
-        </p:nvSpPr>
-        <p:spPr/>
-        <p:txBody>
-          <a:bodyPr/>
-          <a:lstStyle/>
-          <a:p>
-            <a:r>
-              <a:rPr lang="da-DK" dirty="0"/>
-              <a:t>[Indsæt billede af hængelåsen]</a:t>
+              <a:t>TLS/HTTPS</a:t>
+            </a:r>
+          </a:p>
+        </p:txBody>
+      </p:sp>
+      <p:sp>
+        <p:nvSpPr>
+          <p:cNvPr id="4" name="Pladsholder til indhold 2"/>
+          <p:cNvSpPr txBox="1">
+            <a:spLocks/>
+          </p:cNvSpPr>
+          <p:nvPr/>
+        </p:nvSpPr>
+        <p:spPr>
+          <a:xfrm>
+            <a:off x="838200" y="1690688"/>
+            <a:ext cx="9603275" cy="3450613"/>
+          </a:xfrm>
+          <a:prstGeom prst="rect">
+            <a:avLst/>
+          </a:prstGeom>
+        </p:spPr>
+        <p:txBody>
+          <a:bodyPr vert="horz" lIns="91440" tIns="45720" rIns="91440" bIns="45720" rtlCol="0">
+            <a:normAutofit lnSpcReduction="10000"/>
+          </a:bodyPr>
+          <a:lstStyle>
+            <a:lvl1pPr marL="228600" indent="-228600" algn="l" defTabSz="914400" rtl="0" eaLnBrk="1" latinLnBrk="0" hangingPunct="1">
+              <a:lnSpc>
+                <a:spcPct val="90000"/>
+              </a:lnSpc>
+              <a:spcBef>
+                <a:spcPts val="1000"/>
+              </a:spcBef>
+              <a:buFont typeface="Arial" panose="020B0604020202020204" pitchFamily="34" charset="0"/>
+              <a:buChar char="•"/>
+              <a:defRPr sz="2800" kern="1200">
+                <a:solidFill>
+                  <a:schemeClr val="tx1"/>
+                </a:solidFill>
+                <a:latin typeface="+mn-lt"/>
+                <a:ea typeface="+mn-ea"/>
+                <a:cs typeface="+mn-cs"/>
+              </a:defRPr>
+            </a:lvl1pPr>
+            <a:lvl2pPr marL="685800" indent="-228600" algn="l" defTabSz="914400" rtl="0" eaLnBrk="1" latinLnBrk="0" hangingPunct="1">
+              <a:lnSpc>
+                <a:spcPct val="90000"/>
+              </a:lnSpc>
+              <a:spcBef>
+                <a:spcPts val="500"/>
+              </a:spcBef>
+              <a:buFont typeface="Arial" panose="020B0604020202020204" pitchFamily="34" charset="0"/>
+              <a:buChar char="•"/>
+              <a:defRPr sz="2400" kern="1200">
+                <a:solidFill>
+                  <a:schemeClr val="tx1"/>
+                </a:solidFill>
+                <a:latin typeface="+mn-lt"/>
+                <a:ea typeface="+mn-ea"/>
+                <a:cs typeface="+mn-cs"/>
+              </a:defRPr>
+            </a:lvl2pPr>
+            <a:lvl3pPr marL="1143000" indent="-228600" algn="l" defTabSz="914400" rtl="0" eaLnBrk="1" latinLnBrk="0" hangingPunct="1">
+              <a:lnSpc>
+                <a:spcPct val="90000"/>
+              </a:lnSpc>
+              <a:spcBef>
+                <a:spcPts val="500"/>
+              </a:spcBef>
+              <a:buFont typeface="Arial" panose="020B0604020202020204" pitchFamily="34" charset="0"/>
+              <a:buChar char="•"/>
+              <a:defRPr sz="2000" kern="1200">
+                <a:solidFill>
+                  <a:schemeClr val="tx1"/>
+                </a:solidFill>
+                <a:latin typeface="+mn-lt"/>
+                <a:ea typeface="+mn-ea"/>
+                <a:cs typeface="+mn-cs"/>
+              </a:defRPr>
+            </a:lvl3pPr>
+            <a:lvl4pPr marL="1600200" indent="-228600" algn="l" defTabSz="914400" rtl="0" eaLnBrk="1" latinLnBrk="0" hangingPunct="1">
+              <a:lnSpc>
+                <a:spcPct val="90000"/>
+              </a:lnSpc>
+              <a:spcBef>
+                <a:spcPts val="500"/>
+              </a:spcBef>
+              <a:buFont typeface="Arial" panose="020B0604020202020204" pitchFamily="34" charset="0"/>
+              <a:buChar char="•"/>
+              <a:defRPr sz="1800" kern="1200">
+                <a:solidFill>
+                  <a:schemeClr val="tx1"/>
+                </a:solidFill>
+                <a:latin typeface="+mn-lt"/>
+                <a:ea typeface="+mn-ea"/>
+                <a:cs typeface="+mn-cs"/>
+              </a:defRPr>
+            </a:lvl4pPr>
+            <a:lvl5pPr marL="2057400" indent="-228600" algn="l" defTabSz="914400" rtl="0" eaLnBrk="1" latinLnBrk="0" hangingPunct="1">
+              <a:lnSpc>
+                <a:spcPct val="90000"/>
+              </a:lnSpc>
+              <a:spcBef>
+                <a:spcPts val="500"/>
+              </a:spcBef>
+              <a:buFont typeface="Arial" panose="020B0604020202020204" pitchFamily="34" charset="0"/>
+              <a:buChar char="•"/>
+              <a:defRPr sz="1800" kern="1200">
+                <a:solidFill>
+                  <a:schemeClr val="tx1"/>
+                </a:solidFill>
+                <a:latin typeface="+mn-lt"/>
+                <a:ea typeface="+mn-ea"/>
+                <a:cs typeface="+mn-cs"/>
+              </a:defRPr>
+            </a:lvl5pPr>
+            <a:lvl6pPr marL="2514600" indent="-228600" algn="l" defTabSz="914400" rtl="0" eaLnBrk="1" latinLnBrk="0" hangingPunct="1">
+              <a:lnSpc>
+                <a:spcPct val="90000"/>
+              </a:lnSpc>
+              <a:spcBef>
+                <a:spcPts val="500"/>
+              </a:spcBef>
+              <a:buFont typeface="Arial" panose="020B0604020202020204" pitchFamily="34" charset="0"/>
+              <a:buChar char="•"/>
+              <a:defRPr sz="1800" kern="1200">
+                <a:solidFill>
+                  <a:schemeClr val="tx1"/>
+                </a:solidFill>
+                <a:latin typeface="+mn-lt"/>
+                <a:ea typeface="+mn-ea"/>
+                <a:cs typeface="+mn-cs"/>
+              </a:defRPr>
+            </a:lvl6pPr>
+            <a:lvl7pPr marL="2971800" indent="-228600" algn="l" defTabSz="914400" rtl="0" eaLnBrk="1" latinLnBrk="0" hangingPunct="1">
+              <a:lnSpc>
+                <a:spcPct val="90000"/>
+              </a:lnSpc>
+              <a:spcBef>
+                <a:spcPts val="500"/>
+              </a:spcBef>
+              <a:buFont typeface="Arial" panose="020B0604020202020204" pitchFamily="34" charset="0"/>
+              <a:buChar char="•"/>
+              <a:defRPr sz="1800" kern="1200">
+                <a:solidFill>
+                  <a:schemeClr val="tx1"/>
+                </a:solidFill>
+                <a:latin typeface="+mn-lt"/>
+                <a:ea typeface="+mn-ea"/>
+                <a:cs typeface="+mn-cs"/>
+              </a:defRPr>
+            </a:lvl7pPr>
+            <a:lvl8pPr marL="3429000" indent="-228600" algn="l" defTabSz="914400" rtl="0" eaLnBrk="1" latinLnBrk="0" hangingPunct="1">
+              <a:lnSpc>
+                <a:spcPct val="90000"/>
+              </a:lnSpc>
+              <a:spcBef>
+                <a:spcPts val="500"/>
+              </a:spcBef>
+              <a:buFont typeface="Arial" panose="020B0604020202020204" pitchFamily="34" charset="0"/>
+              <a:buChar char="•"/>
+              <a:defRPr sz="1800" kern="1200">
+                <a:solidFill>
+                  <a:schemeClr val="tx1"/>
+                </a:solidFill>
+                <a:latin typeface="+mn-lt"/>
+                <a:ea typeface="+mn-ea"/>
+                <a:cs typeface="+mn-cs"/>
+              </a:defRPr>
+            </a:lvl8pPr>
+            <a:lvl9pPr marL="3886200" indent="-228600" algn="l" defTabSz="914400" rtl="0" eaLnBrk="1" latinLnBrk="0" hangingPunct="1">
+              <a:lnSpc>
+                <a:spcPct val="90000"/>
+              </a:lnSpc>
+              <a:spcBef>
+                <a:spcPts val="500"/>
+              </a:spcBef>
+              <a:buFont typeface="Arial" panose="020B0604020202020204" pitchFamily="34" charset="0"/>
+              <a:buChar char="•"/>
+              <a:defRPr sz="1800" kern="1200">
+                <a:solidFill>
+                  <a:schemeClr val="tx1"/>
+                </a:solidFill>
+                <a:latin typeface="+mn-lt"/>
+                <a:ea typeface="+mn-ea"/>
+                <a:cs typeface="+mn-cs"/>
+              </a:defRPr>
+            </a:lvl9pPr>
+          </a:lstStyle>
+          <a:p>
+            <a:r>
+              <a:rPr lang="da-DK" dirty="0"/>
+              <a:t>TLS står for Transport </a:t>
+            </a:r>
+            <a:r>
+              <a:rPr lang="da-DK" dirty="0" err="1"/>
+              <a:t>Layer</a:t>
+            </a:r>
+            <a:r>
+              <a:rPr lang="da-DK" dirty="0"/>
+              <a:t> Security og er et lag man kan lægge over HTTP, så man får HTTPS – kan I gætte hvad S’et står for? </a:t>
+            </a:r>
+            <a:r>
+              <a:rPr lang="da-DK" dirty="0">
+                <a:sym typeface="Wingdings" panose="05000000000000000000" pitchFamily="2" charset="2"/>
+              </a:rPr>
+              <a:t> </a:t>
+            </a:r>
+          </a:p>
+          <a:p>
+            <a:r>
+              <a:rPr lang="da-DK" dirty="0"/>
+              <a:t>Gør flere ting: </a:t>
+            </a:r>
+          </a:p>
+          <a:p>
+            <a:pPr lvl="1"/>
+            <a:r>
+              <a:rPr lang="da-DK" dirty="0"/>
+              <a:t>Autentificering af websted</a:t>
+            </a:r>
+          </a:p>
+          <a:p>
+            <a:pPr lvl="1"/>
+            <a:r>
+              <a:rPr lang="da-DK" dirty="0"/>
+              <a:t>Krypteret forbindelse</a:t>
+            </a:r>
+          </a:p>
+          <a:p>
+            <a:r>
+              <a:rPr lang="da-DK" dirty="0"/>
+              <a:t>Beskytter mod: </a:t>
+            </a:r>
+          </a:p>
+          <a:p>
+            <a:pPr lvl="1"/>
+            <a:r>
+              <a:rPr lang="da-DK" dirty="0"/>
+              <a:t>Man in the </a:t>
+            </a:r>
+            <a:r>
+              <a:rPr lang="da-DK" dirty="0" err="1"/>
+              <a:t>middle</a:t>
+            </a:r>
+            <a:endParaRPr lang="da-DK" dirty="0"/>
+          </a:p>
+          <a:p>
+            <a:pPr lvl="1"/>
+            <a:r>
+              <a:rPr lang="da-DK" dirty="0"/>
+              <a:t>Aflytning</a:t>
             </a:r>
           </a:p>
         </p:txBody>
@@ -5806,7 +6036,7 @@
                 </a:r>
                 <a:r>
                   <a:rPr lang="da-DK" i="1" dirty="0"/>
-                  <a:t>g </a:t>
+                  <a:t>g, p </a:t>
                 </a:r>
                 <a:r>
                   <a:rPr lang="da-DK" dirty="0"/>
@@ -5938,7 +6168,7 @@
           <a:p>
             <a:r>
               <a:rPr lang="da-DK" dirty="0"/>
-              <a:t>De er kendetegnet ved at tage en streng som input, et password, og </a:t>
+              <a:t>De er kendetegnet ved at tage en streng som input - et password - og </a:t>
             </a:r>
             <a:r>
               <a:rPr lang="da-DK" dirty="0" err="1"/>
@@ -5952,7 +6182,7 @@
           <a:p>
             <a:r>
               <a:rPr lang="da-DK" dirty="0"/>
-              <a:t>Det gælder at hvert password har netop en hash-værdi. </a:t>
+              <a:t>Det gælder at hvert input har netop en hash-værdi. </a:t>
             </a:r>
           </a:p>
           <a:p>
@@ -6789,7 +7019,7 @@
           <a:p>
             <a:r>
               <a:rPr lang="da-DK" sz="3600" dirty="0"/>
-              <a:t>Når vi slutter i dag så kender I til alm. Angrebsteknikker, kryptografi og adgangskontrol. </a:t>
+              <a:t>Når vi slutter i dag så kender I til alm. angrebsteknikker, kryptografi og adgangskontrol. </a:t>
             </a:r>
           </a:p>
         </p:txBody>
@@ -8139,7 +8369,6 @@
               <a:rPr lang="da-DK" dirty="0"/>
               <a:t>Organisatoriske/menneskelige angrebspunkter</a:t>
             </a:r>
-            <a:endParaRPr lang="da-DK" dirty="0"/>
           </a:p>
         </p:txBody>
       </p:sp>
@@ -8160,7 +8389,7 @@
           <a:p>
             <a:r>
               <a:rPr lang="da-DK" dirty="0"/>
-              <a:t>Diskuter i 2 min. 2 eksempler Med sidemanden hvad nogle organisatoriske eller menneskelige angrebspunkter kunne være. </a:t>
+              <a:t>Diskuter i 2 min. 2 eksempler med sidemanden hvad nogle organisatoriske eller menneskelige angrebspunkter kunne være. </a:t>
             </a:r>
           </a:p>
         </p:txBody>

</xml_diff>